<commit_message>
Dashboard color circles changed
</commit_message>
<xml_diff>
--- a/src/main/resources/content/Presentation/Mockup - Scores.pptx
+++ b/src/main/resources/content/Presentation/Mockup - Scores.pptx
@@ -6,6 +6,9 @@
   </p:sldMasterIdLst>
   <p:sldIdLst>
     <p:sldId id="258" r:id="rId2"/>
+    <p:sldId id="259" r:id="rId3"/>
+    <p:sldId id="260" r:id="rId4"/>
+    <p:sldId id="261" r:id="rId5"/>
   </p:sldIdLst>
   <p:sldSz cx="9144000" cy="6858000" type="screen4x3"/>
   <p:notesSz cx="6858000" cy="9144000"/>
@@ -2977,8 +2980,8 @@
         </p:nvSpPr>
         <p:spPr>
           <a:xfrm>
-            <a:off x="1020908" y="668572"/>
-            <a:ext cx="2917247" cy="1134245"/>
+            <a:off x="1020908" y="668571"/>
+            <a:ext cx="2917247" cy="1399219"/>
           </a:xfrm>
           <a:prstGeom prst="roundRect">
             <a:avLst/>
@@ -3025,8 +3028,8 @@
         </p:nvSpPr>
         <p:spPr>
           <a:xfrm>
-            <a:off x="1166382" y="870916"/>
-            <a:ext cx="724764" cy="676023"/>
+            <a:off x="1353419" y="891698"/>
+            <a:ext cx="932581" cy="916319"/>
           </a:xfrm>
           <a:prstGeom prst="ellipse">
             <a:avLst/>
@@ -3062,7 +3065,11 @@
           <a:p>
             <a:pPr algn="ctr"/>
             <a:r>
-              <a:rPr lang="en-US" sz="4050" dirty="0"/>
+              <a:rPr lang="en-US" sz="4050" dirty="0">
+                <a:solidFill>
+                  <a:schemeClr val="tx1"/>
+                </a:solidFill>
+              </a:rPr>
               <a:t>D</a:t>
             </a:r>
           </a:p>
@@ -3076,8 +3083,8 @@
         </p:nvSpPr>
         <p:spPr>
           <a:xfrm>
-            <a:off x="2337955" y="368873"/>
-            <a:ext cx="1561245" cy="338554"/>
+            <a:off x="1745673" y="348091"/>
+            <a:ext cx="2153527" cy="338554"/>
           </a:xfrm>
           <a:prstGeom prst="rect">
             <a:avLst/>
@@ -3091,28 +3098,37 @@
           <a:lstStyle/>
           <a:p>
             <a:r>
+              <a:rPr lang="en-US" sz="1600" b="1" dirty="0" smtClean="0"/>
+              <a:t>App.Maint</a:t>
+            </a:r>
+            <a:r>
               <a:rPr lang="en-US" sz="1600" b="1" dirty="0"/>
-              <a:t>Infra Risk Score</a:t>
-            </a:r>
-          </a:p>
-        </p:txBody>
-      </p:sp>
-      <p:sp>
-        <p:nvSpPr>
-          <p:cNvPr id="6" name="Rounded Rectangle 5"/>
+              <a:t> </a:t>
+            </a:r>
+            <a:r>
+              <a:rPr lang="en-US" sz="1600" b="1" dirty="0" smtClean="0"/>
+              <a:t>Score Card</a:t>
+            </a:r>
+            <a:endParaRPr lang="en-US" sz="1600" b="1" dirty="0"/>
+          </a:p>
+        </p:txBody>
+      </p:sp>
+      <p:sp>
+        <p:nvSpPr>
+          <p:cNvPr id="10" name="Rounded Rectangle 9"/>
           <p:cNvSpPr/>
           <p:nvPr/>
         </p:nvSpPr>
         <p:spPr>
           <a:xfrm>
-            <a:off x="5553938" y="2822093"/>
-            <a:ext cx="2119349" cy="1134245"/>
+            <a:off x="1017443" y="4031764"/>
+            <a:ext cx="2917247" cy="1399219"/>
           </a:xfrm>
           <a:prstGeom prst="roundRect">
             <a:avLst/>
           </a:prstGeom>
           <a:noFill/>
-          <a:ln w="76200">
+          <a:ln w="38100">
             <a:solidFill>
               <a:schemeClr val="bg1">
                 <a:lumMod val="50000"/>
@@ -3147,14 +3163,611 @@
       </p:sp>
       <p:sp>
         <p:nvSpPr>
-          <p:cNvPr id="7" name="Oval 6"/>
+          <p:cNvPr id="11" name="Oval 10"/>
           <p:cNvSpPr/>
           <p:nvPr/>
         </p:nvSpPr>
         <p:spPr>
           <a:xfrm>
-            <a:off x="5740975" y="2928678"/>
-            <a:ext cx="857133" cy="844519"/>
+            <a:off x="1349954" y="4254891"/>
+            <a:ext cx="932581" cy="916319"/>
+          </a:xfrm>
+          <a:prstGeom prst="ellipse">
+            <a:avLst/>
+          </a:prstGeom>
+          <a:solidFill>
+            <a:srgbClr val="FFC000"/>
+          </a:solidFill>
+          <a:ln>
+            <a:solidFill>
+              <a:schemeClr val="tx1"/>
+            </a:solidFill>
+          </a:ln>
+        </p:spPr>
+        <p:style>
+          <a:lnRef idx="2">
+            <a:schemeClr val="accent1">
+              <a:shade val="50000"/>
+            </a:schemeClr>
+          </a:lnRef>
+          <a:fillRef idx="1">
+            <a:schemeClr val="accent1"/>
+          </a:fillRef>
+          <a:effectRef idx="0">
+            <a:schemeClr val="accent1"/>
+          </a:effectRef>
+          <a:fontRef idx="minor">
+            <a:schemeClr val="lt1"/>
+          </a:fontRef>
+        </p:style>
+        <p:txBody>
+          <a:bodyPr rtlCol="0" anchor="ctr"/>
+          <a:lstStyle/>
+          <a:p>
+            <a:pPr algn="ctr"/>
+            <a:r>
+              <a:rPr lang="en-US" sz="4050" dirty="0">
+                <a:solidFill>
+                  <a:schemeClr val="tx1"/>
+                </a:solidFill>
+              </a:rPr>
+              <a:t>B</a:t>
+            </a:r>
+          </a:p>
+        </p:txBody>
+      </p:sp>
+      <p:sp>
+        <p:nvSpPr>
+          <p:cNvPr id="12" name="TextBox 11"/>
+          <p:cNvSpPr txBox="1"/>
+          <p:nvPr/>
+        </p:nvSpPr>
+        <p:spPr>
+          <a:xfrm>
+            <a:off x="1742208" y="3711284"/>
+            <a:ext cx="2153527" cy="338554"/>
+          </a:xfrm>
+          <a:prstGeom prst="rect">
+            <a:avLst/>
+          </a:prstGeom>
+          <a:noFill/>
+        </p:spPr>
+        <p:txBody>
+          <a:bodyPr wrap="square" rtlCol="0">
+            <a:spAutoFit/>
+          </a:bodyPr>
+          <a:lstStyle/>
+          <a:p>
+            <a:r>
+              <a:rPr lang="en-US" sz="1600" b="1" dirty="0" smtClean="0"/>
+              <a:t>App.Maint</a:t>
+            </a:r>
+            <a:r>
+              <a:rPr lang="en-US" sz="1600" b="1" dirty="0"/>
+              <a:t> </a:t>
+            </a:r>
+            <a:r>
+              <a:rPr lang="en-US" sz="1600" b="1" dirty="0" smtClean="0"/>
+              <a:t>Score Card</a:t>
+            </a:r>
+            <a:endParaRPr lang="en-US" sz="1600" b="1" dirty="0"/>
+          </a:p>
+        </p:txBody>
+      </p:sp>
+      <p:sp>
+        <p:nvSpPr>
+          <p:cNvPr id="13" name="Rounded Rectangle 12"/>
+          <p:cNvSpPr/>
+          <p:nvPr/>
+        </p:nvSpPr>
+        <p:spPr>
+          <a:xfrm>
+            <a:off x="5194590" y="665106"/>
+            <a:ext cx="2917247" cy="1399219"/>
+          </a:xfrm>
+          <a:prstGeom prst="roundRect">
+            <a:avLst/>
+          </a:prstGeom>
+          <a:noFill/>
+          <a:ln w="38100">
+            <a:solidFill>
+              <a:schemeClr val="bg1">
+                <a:lumMod val="50000"/>
+              </a:schemeClr>
+            </a:solidFill>
+          </a:ln>
+        </p:spPr>
+        <p:style>
+          <a:lnRef idx="2">
+            <a:schemeClr val="accent1">
+              <a:shade val="50000"/>
+            </a:schemeClr>
+          </a:lnRef>
+          <a:fillRef idx="1">
+            <a:schemeClr val="accent1"/>
+          </a:fillRef>
+          <a:effectRef idx="0">
+            <a:schemeClr val="accent1"/>
+          </a:effectRef>
+          <a:fontRef idx="minor">
+            <a:schemeClr val="lt1"/>
+          </a:fontRef>
+        </p:style>
+        <p:txBody>
+          <a:bodyPr rtlCol="0" anchor="ctr"/>
+          <a:lstStyle/>
+          <a:p>
+            <a:pPr algn="ctr"/>
+            <a:endParaRPr lang="en-US" sz="1050"/>
+          </a:p>
+        </p:txBody>
+      </p:sp>
+      <p:sp>
+        <p:nvSpPr>
+          <p:cNvPr id="14" name="Oval 13"/>
+          <p:cNvSpPr/>
+          <p:nvPr/>
+        </p:nvSpPr>
+        <p:spPr>
+          <a:xfrm>
+            <a:off x="5527101" y="888233"/>
+            <a:ext cx="932581" cy="916319"/>
+          </a:xfrm>
+          <a:prstGeom prst="ellipse">
+            <a:avLst/>
+          </a:prstGeom>
+          <a:solidFill>
+            <a:schemeClr val="accent4">
+              <a:lumMod val="60000"/>
+              <a:lumOff val="40000"/>
+            </a:schemeClr>
+          </a:solidFill>
+          <a:ln>
+            <a:solidFill>
+              <a:schemeClr val="tx1"/>
+            </a:solidFill>
+          </a:ln>
+        </p:spPr>
+        <p:style>
+          <a:lnRef idx="2">
+            <a:schemeClr val="accent1">
+              <a:shade val="50000"/>
+            </a:schemeClr>
+          </a:lnRef>
+          <a:fillRef idx="1">
+            <a:schemeClr val="accent1"/>
+          </a:fillRef>
+          <a:effectRef idx="0">
+            <a:schemeClr val="accent1"/>
+          </a:effectRef>
+          <a:fontRef idx="minor">
+            <a:schemeClr val="lt1"/>
+          </a:fontRef>
+        </p:style>
+        <p:txBody>
+          <a:bodyPr rtlCol="0" anchor="ctr"/>
+          <a:lstStyle/>
+          <a:p>
+            <a:pPr algn="ctr"/>
+            <a:r>
+              <a:rPr lang="en-US" sz="4050" dirty="0">
+                <a:solidFill>
+                  <a:schemeClr val="tx1"/>
+                </a:solidFill>
+              </a:rPr>
+              <a:t>C</a:t>
+            </a:r>
+          </a:p>
+        </p:txBody>
+      </p:sp>
+      <p:sp>
+        <p:nvSpPr>
+          <p:cNvPr id="15" name="TextBox 14"/>
+          <p:cNvSpPr txBox="1"/>
+          <p:nvPr/>
+        </p:nvSpPr>
+        <p:spPr>
+          <a:xfrm>
+            <a:off x="5919355" y="344626"/>
+            <a:ext cx="2153527" cy="338554"/>
+          </a:xfrm>
+          <a:prstGeom prst="rect">
+            <a:avLst/>
+          </a:prstGeom>
+          <a:noFill/>
+        </p:spPr>
+        <p:txBody>
+          <a:bodyPr wrap="square" rtlCol="0">
+            <a:spAutoFit/>
+          </a:bodyPr>
+          <a:lstStyle/>
+          <a:p>
+            <a:r>
+              <a:rPr lang="en-US" sz="1600" b="1" dirty="0" smtClean="0"/>
+              <a:t>App.Maint</a:t>
+            </a:r>
+            <a:r>
+              <a:rPr lang="en-US" sz="1600" b="1" dirty="0"/>
+              <a:t> </a:t>
+            </a:r>
+            <a:r>
+              <a:rPr lang="en-US" sz="1600" b="1" dirty="0" smtClean="0"/>
+              <a:t>Score Card</a:t>
+            </a:r>
+            <a:endParaRPr lang="en-US" sz="1600" b="1" dirty="0"/>
+          </a:p>
+        </p:txBody>
+      </p:sp>
+      <p:sp>
+        <p:nvSpPr>
+          <p:cNvPr id="16" name="Rounded Rectangle 15"/>
+          <p:cNvSpPr/>
+          <p:nvPr/>
+        </p:nvSpPr>
+        <p:spPr>
+          <a:xfrm>
+            <a:off x="5194590" y="4031763"/>
+            <a:ext cx="2917247" cy="1399219"/>
+          </a:xfrm>
+          <a:prstGeom prst="roundRect">
+            <a:avLst/>
+          </a:prstGeom>
+          <a:noFill/>
+          <a:ln w="38100">
+            <a:solidFill>
+              <a:schemeClr val="bg1">
+                <a:lumMod val="50000"/>
+              </a:schemeClr>
+            </a:solidFill>
+          </a:ln>
+        </p:spPr>
+        <p:style>
+          <a:lnRef idx="2">
+            <a:schemeClr val="accent1">
+              <a:shade val="50000"/>
+            </a:schemeClr>
+          </a:lnRef>
+          <a:fillRef idx="1">
+            <a:schemeClr val="accent1"/>
+          </a:fillRef>
+          <a:effectRef idx="0">
+            <a:schemeClr val="accent1"/>
+          </a:effectRef>
+          <a:fontRef idx="minor">
+            <a:schemeClr val="lt1"/>
+          </a:fontRef>
+        </p:style>
+        <p:txBody>
+          <a:bodyPr rtlCol="0" anchor="ctr"/>
+          <a:lstStyle/>
+          <a:p>
+            <a:pPr algn="ctr"/>
+            <a:endParaRPr lang="en-US" sz="1050"/>
+          </a:p>
+        </p:txBody>
+      </p:sp>
+      <p:sp>
+        <p:nvSpPr>
+          <p:cNvPr id="17" name="Oval 16"/>
+          <p:cNvSpPr/>
+          <p:nvPr/>
+        </p:nvSpPr>
+        <p:spPr>
+          <a:xfrm>
+            <a:off x="5527101" y="4254890"/>
+            <a:ext cx="932581" cy="916319"/>
+          </a:xfrm>
+          <a:prstGeom prst="ellipse">
+            <a:avLst/>
+          </a:prstGeom>
+          <a:solidFill>
+            <a:schemeClr val="accent6">
+              <a:lumMod val="75000"/>
+            </a:schemeClr>
+          </a:solidFill>
+          <a:ln>
+            <a:solidFill>
+              <a:schemeClr val="tx1"/>
+            </a:solidFill>
+          </a:ln>
+        </p:spPr>
+        <p:style>
+          <a:lnRef idx="2">
+            <a:schemeClr val="accent1">
+              <a:shade val="50000"/>
+            </a:schemeClr>
+          </a:lnRef>
+          <a:fillRef idx="1">
+            <a:schemeClr val="accent1"/>
+          </a:fillRef>
+          <a:effectRef idx="0">
+            <a:schemeClr val="accent1"/>
+          </a:effectRef>
+          <a:fontRef idx="minor">
+            <a:schemeClr val="lt1"/>
+          </a:fontRef>
+        </p:style>
+        <p:txBody>
+          <a:bodyPr rtlCol="0" anchor="ctr"/>
+          <a:lstStyle/>
+          <a:p>
+            <a:pPr algn="ctr"/>
+            <a:r>
+              <a:rPr lang="en-US" sz="4050" dirty="0">
+                <a:solidFill>
+                  <a:schemeClr val="tx1"/>
+                </a:solidFill>
+              </a:rPr>
+              <a:t>A</a:t>
+            </a:r>
+          </a:p>
+        </p:txBody>
+      </p:sp>
+      <p:sp>
+        <p:nvSpPr>
+          <p:cNvPr id="18" name="TextBox 17"/>
+          <p:cNvSpPr txBox="1"/>
+          <p:nvPr/>
+        </p:nvSpPr>
+        <p:spPr>
+          <a:xfrm>
+            <a:off x="5919355" y="3711283"/>
+            <a:ext cx="2153527" cy="338554"/>
+          </a:xfrm>
+          <a:prstGeom prst="rect">
+            <a:avLst/>
+          </a:prstGeom>
+          <a:noFill/>
+        </p:spPr>
+        <p:txBody>
+          <a:bodyPr wrap="square" rtlCol="0">
+            <a:spAutoFit/>
+          </a:bodyPr>
+          <a:lstStyle/>
+          <a:p>
+            <a:r>
+              <a:rPr lang="en-US" sz="1600" b="1" dirty="0" smtClean="0"/>
+              <a:t>App.Maint</a:t>
+            </a:r>
+            <a:r>
+              <a:rPr lang="en-US" sz="1600" b="1" dirty="0"/>
+              <a:t> </a:t>
+            </a:r>
+            <a:r>
+              <a:rPr lang="en-US" sz="1600" b="1" dirty="0" smtClean="0"/>
+              <a:t>Score Card</a:t>
+            </a:r>
+            <a:endParaRPr lang="en-US" sz="1600" b="1" dirty="0"/>
+          </a:p>
+        </p:txBody>
+      </p:sp>
+    </p:spTree>
+    <p:extLst>
+      <p:ext uri="{BB962C8B-B14F-4D97-AF65-F5344CB8AC3E}">
+        <p14:creationId xmlns:p14="http://schemas.microsoft.com/office/powerpoint/2010/main" val="914384786"/>
+      </p:ext>
+    </p:extLst>
+  </p:cSld>
+  <p:clrMapOvr>
+    <a:masterClrMapping/>
+  </p:clrMapOvr>
+  <p:timing>
+    <p:tnLst>
+      <p:par>
+        <p:cTn id="1" dur="indefinite" restart="never" nodeType="tmRoot"/>
+      </p:par>
+    </p:tnLst>
+  </p:timing>
+</p:sld>
+</file>
+
+<file path=ppt/slides/slide2.xml><?xml version="1.0" encoding="utf-8"?>
+<p:sld xmlns:a="http://schemas.openxmlformats.org/drawingml/2006/main" xmlns:r="http://schemas.openxmlformats.org/officeDocument/2006/relationships" xmlns:p="http://schemas.openxmlformats.org/presentationml/2006/main">
+  <p:cSld>
+    <p:spTree>
+      <p:nvGrpSpPr>
+        <p:cNvPr id="1" name=""/>
+        <p:cNvGrpSpPr/>
+        <p:nvPr/>
+      </p:nvGrpSpPr>
+      <p:grpSpPr>
+        <a:xfrm>
+          <a:off x="0" y="0"/>
+          <a:ext cx="0" cy="0"/>
+          <a:chOff x="0" y="0"/>
+          <a:chExt cx="0" cy="0"/>
+        </a:xfrm>
+      </p:grpSpPr>
+      <p:sp>
+        <p:nvSpPr>
+          <p:cNvPr id="10" name="Rounded Rectangle 9"/>
+          <p:cNvSpPr/>
+          <p:nvPr/>
+        </p:nvSpPr>
+        <p:spPr>
+          <a:xfrm>
+            <a:off x="1017443" y="4031764"/>
+            <a:ext cx="2917247" cy="1399219"/>
+          </a:xfrm>
+          <a:prstGeom prst="roundRect">
+            <a:avLst/>
+          </a:prstGeom>
+          <a:noFill/>
+          <a:ln w="38100">
+            <a:solidFill>
+              <a:schemeClr val="bg1">
+                <a:lumMod val="50000"/>
+              </a:schemeClr>
+            </a:solidFill>
+          </a:ln>
+        </p:spPr>
+        <p:style>
+          <a:lnRef idx="2">
+            <a:schemeClr val="accent1">
+              <a:shade val="50000"/>
+            </a:schemeClr>
+          </a:lnRef>
+          <a:fillRef idx="1">
+            <a:schemeClr val="accent1"/>
+          </a:fillRef>
+          <a:effectRef idx="0">
+            <a:schemeClr val="accent1"/>
+          </a:effectRef>
+          <a:fontRef idx="minor">
+            <a:schemeClr val="lt1"/>
+          </a:fontRef>
+        </p:style>
+        <p:txBody>
+          <a:bodyPr rtlCol="0" anchor="ctr"/>
+          <a:lstStyle/>
+          <a:p>
+            <a:pPr algn="ctr"/>
+            <a:endParaRPr lang="en-US" sz="1050"/>
+          </a:p>
+        </p:txBody>
+      </p:sp>
+      <p:sp>
+        <p:nvSpPr>
+          <p:cNvPr id="11" name="Oval 10"/>
+          <p:cNvSpPr/>
+          <p:nvPr/>
+        </p:nvSpPr>
+        <p:spPr>
+          <a:xfrm>
+            <a:off x="1349954" y="4254891"/>
+            <a:ext cx="932581" cy="916319"/>
+          </a:xfrm>
+          <a:prstGeom prst="ellipse">
+            <a:avLst/>
+          </a:prstGeom>
+          <a:solidFill>
+            <a:srgbClr val="FFC000"/>
+          </a:solidFill>
+          <a:ln>
+            <a:solidFill>
+              <a:schemeClr val="tx1"/>
+            </a:solidFill>
+          </a:ln>
+        </p:spPr>
+        <p:style>
+          <a:lnRef idx="2">
+            <a:schemeClr val="accent1">
+              <a:shade val="50000"/>
+            </a:schemeClr>
+          </a:lnRef>
+          <a:fillRef idx="1">
+            <a:schemeClr val="accent1"/>
+          </a:fillRef>
+          <a:effectRef idx="0">
+            <a:schemeClr val="accent1"/>
+          </a:effectRef>
+          <a:fontRef idx="minor">
+            <a:schemeClr val="lt1"/>
+          </a:fontRef>
+        </p:style>
+        <p:txBody>
+          <a:bodyPr rtlCol="0" anchor="ctr"/>
+          <a:lstStyle/>
+          <a:p>
+            <a:pPr algn="ctr"/>
+            <a:r>
+              <a:rPr lang="en-US" sz="4050" dirty="0">
+                <a:solidFill>
+                  <a:schemeClr val="tx1"/>
+                </a:solidFill>
+              </a:rPr>
+              <a:t>B</a:t>
+            </a:r>
+          </a:p>
+        </p:txBody>
+      </p:sp>
+      <p:sp>
+        <p:nvSpPr>
+          <p:cNvPr id="12" name="TextBox 11"/>
+          <p:cNvSpPr txBox="1"/>
+          <p:nvPr/>
+        </p:nvSpPr>
+        <p:spPr>
+          <a:xfrm>
+            <a:off x="1742208" y="3711284"/>
+            <a:ext cx="2153527" cy="338554"/>
+          </a:xfrm>
+          <a:prstGeom prst="rect">
+            <a:avLst/>
+          </a:prstGeom>
+          <a:noFill/>
+        </p:spPr>
+        <p:txBody>
+          <a:bodyPr wrap="square" rtlCol="0">
+            <a:spAutoFit/>
+          </a:bodyPr>
+          <a:lstStyle/>
+          <a:p>
+            <a:r>
+              <a:rPr lang="en-US" sz="1600" b="1" dirty="0"/>
+              <a:t>Infra Risk Score Card</a:t>
+            </a:r>
+          </a:p>
+        </p:txBody>
+      </p:sp>
+      <p:sp>
+        <p:nvSpPr>
+          <p:cNvPr id="13" name="Rounded Rectangle 12"/>
+          <p:cNvSpPr/>
+          <p:nvPr/>
+        </p:nvSpPr>
+        <p:spPr>
+          <a:xfrm>
+            <a:off x="5194590" y="665106"/>
+            <a:ext cx="2917247" cy="1399219"/>
+          </a:xfrm>
+          <a:prstGeom prst="roundRect">
+            <a:avLst/>
+          </a:prstGeom>
+          <a:noFill/>
+          <a:ln w="38100">
+            <a:solidFill>
+              <a:schemeClr val="bg1">
+                <a:lumMod val="50000"/>
+              </a:schemeClr>
+            </a:solidFill>
+          </a:ln>
+        </p:spPr>
+        <p:style>
+          <a:lnRef idx="2">
+            <a:schemeClr val="accent1">
+              <a:shade val="50000"/>
+            </a:schemeClr>
+          </a:lnRef>
+          <a:fillRef idx="1">
+            <a:schemeClr val="accent1"/>
+          </a:fillRef>
+          <a:effectRef idx="0">
+            <a:schemeClr val="accent1"/>
+          </a:effectRef>
+          <a:fontRef idx="minor">
+            <a:schemeClr val="lt1"/>
+          </a:fontRef>
+        </p:style>
+        <p:txBody>
+          <a:bodyPr rtlCol="0" anchor="ctr"/>
+          <a:lstStyle/>
+          <a:p>
+            <a:pPr algn="ctr"/>
+            <a:endParaRPr lang="en-US" sz="1050"/>
+          </a:p>
+        </p:txBody>
+      </p:sp>
+      <p:sp>
+        <p:nvSpPr>
+          <p:cNvPr id="14" name="Oval 13"/>
+          <p:cNvSpPr/>
+          <p:nvPr/>
+        </p:nvSpPr>
+        <p:spPr>
+          <a:xfrm>
+            <a:off x="5527101" y="888233"/>
+            <a:ext cx="932581" cy="916319"/>
           </a:xfrm>
           <a:prstGeom prst="ellipse">
             <a:avLst/>
@@ -3190,22 +3803,26 @@
           <a:p>
             <a:pPr algn="ctr"/>
             <a:r>
-              <a:rPr lang="en-US" sz="4050" dirty="0"/>
-              <a:t>A</a:t>
-            </a:r>
-          </a:p>
-        </p:txBody>
-      </p:sp>
-      <p:sp>
-        <p:nvSpPr>
-          <p:cNvPr id="8" name="TextBox 7"/>
+              <a:rPr lang="en-US" sz="4050" dirty="0">
+                <a:solidFill>
+                  <a:schemeClr val="tx1"/>
+                </a:solidFill>
+              </a:rPr>
+              <a:t>C</a:t>
+            </a:r>
+          </a:p>
+        </p:txBody>
+      </p:sp>
+      <p:sp>
+        <p:nvSpPr>
+          <p:cNvPr id="15" name="TextBox 14"/>
           <p:cNvSpPr txBox="1"/>
           <p:nvPr/>
         </p:nvSpPr>
         <p:spPr>
           <a:xfrm>
-            <a:off x="6775854" y="3095632"/>
-            <a:ext cx="660424" cy="1015663"/>
+            <a:off x="5919355" y="344626"/>
+            <a:ext cx="2153527" cy="338554"/>
           </a:xfrm>
           <a:prstGeom prst="rect">
             <a:avLst/>
@@ -3219,22 +3836,127 @@
           <a:lstStyle/>
           <a:p>
             <a:r>
-              <a:rPr lang="en-US" sz="3000" b="1" dirty="0"/>
-              <a:t>5.0</a:t>
-            </a:r>
-          </a:p>
-        </p:txBody>
-      </p:sp>
-      <p:sp>
-        <p:nvSpPr>
-          <p:cNvPr id="9" name="TextBox 8"/>
+              <a:rPr lang="en-US" sz="1600" b="1" dirty="0"/>
+              <a:t>Infra Risk Score Card</a:t>
+            </a:r>
+          </a:p>
+        </p:txBody>
+      </p:sp>
+      <p:sp>
+        <p:nvSpPr>
+          <p:cNvPr id="16" name="Rounded Rectangle 15"/>
+          <p:cNvSpPr/>
+          <p:nvPr/>
+        </p:nvSpPr>
+        <p:spPr>
+          <a:xfrm>
+            <a:off x="5194590" y="4031763"/>
+            <a:ext cx="2917247" cy="1399219"/>
+          </a:xfrm>
+          <a:prstGeom prst="roundRect">
+            <a:avLst/>
+          </a:prstGeom>
+          <a:noFill/>
+          <a:ln w="38100">
+            <a:solidFill>
+              <a:schemeClr val="bg1">
+                <a:lumMod val="50000"/>
+              </a:schemeClr>
+            </a:solidFill>
+          </a:ln>
+        </p:spPr>
+        <p:style>
+          <a:lnRef idx="2">
+            <a:schemeClr val="accent1">
+              <a:shade val="50000"/>
+            </a:schemeClr>
+          </a:lnRef>
+          <a:fillRef idx="1">
+            <a:schemeClr val="accent1"/>
+          </a:fillRef>
+          <a:effectRef idx="0">
+            <a:schemeClr val="accent1"/>
+          </a:effectRef>
+          <a:fontRef idx="minor">
+            <a:schemeClr val="lt1"/>
+          </a:fontRef>
+        </p:style>
+        <p:txBody>
+          <a:bodyPr rtlCol="0" anchor="ctr"/>
+          <a:lstStyle/>
+          <a:p>
+            <a:pPr algn="ctr"/>
+            <a:endParaRPr lang="en-US" sz="1050"/>
+          </a:p>
+        </p:txBody>
+      </p:sp>
+      <p:sp>
+        <p:nvSpPr>
+          <p:cNvPr id="17" name="Oval 16"/>
+          <p:cNvSpPr/>
+          <p:nvPr/>
+        </p:nvSpPr>
+        <p:spPr>
+          <a:xfrm>
+            <a:off x="5527101" y="4254890"/>
+            <a:ext cx="932581" cy="916319"/>
+          </a:xfrm>
+          <a:prstGeom prst="ellipse">
+            <a:avLst/>
+          </a:prstGeom>
+          <a:solidFill>
+            <a:schemeClr val="accent6">
+              <a:lumMod val="75000"/>
+            </a:schemeClr>
+          </a:solidFill>
+          <a:ln>
+            <a:solidFill>
+              <a:schemeClr val="tx1"/>
+            </a:solidFill>
+          </a:ln>
+        </p:spPr>
+        <p:style>
+          <a:lnRef idx="2">
+            <a:schemeClr val="accent1">
+              <a:shade val="50000"/>
+            </a:schemeClr>
+          </a:lnRef>
+          <a:fillRef idx="1">
+            <a:schemeClr val="accent1"/>
+          </a:fillRef>
+          <a:effectRef idx="0">
+            <a:schemeClr val="accent1"/>
+          </a:effectRef>
+          <a:fontRef idx="minor">
+            <a:schemeClr val="lt1"/>
+          </a:fontRef>
+        </p:style>
+        <p:txBody>
+          <a:bodyPr rtlCol="0" anchor="ctr"/>
+          <a:lstStyle/>
+          <a:p>
+            <a:pPr algn="ctr"/>
+            <a:r>
+              <a:rPr lang="en-US" sz="4050" dirty="0">
+                <a:solidFill>
+                  <a:schemeClr val="tx1"/>
+                </a:solidFill>
+              </a:rPr>
+              <a:t>A</a:t>
+            </a:r>
+          </a:p>
+        </p:txBody>
+      </p:sp>
+      <p:sp>
+        <p:nvSpPr>
+          <p:cNvPr id="18" name="TextBox 17"/>
           <p:cNvSpPr txBox="1"/>
           <p:nvPr/>
         </p:nvSpPr>
         <p:spPr>
           <a:xfrm>
-            <a:off x="5720072" y="2537982"/>
-            <a:ext cx="1756071" cy="553998"/>
+            <a:off x="5919355" y="3711283"/>
+            <a:ext cx="2153527" cy="338554"/>
           </a:xfrm>
           <a:prstGeom prst="rect">
             <a:avLst/>
@@ -3248,8 +3970,8 @@
           <a:lstStyle/>
           <a:p>
             <a:r>
-              <a:rPr lang="en-US" sz="1500" b="1" dirty="0"/>
-              <a:t>Security Risk Score</a:t>
+              <a:rPr lang="en-US" sz="1600" b="1" dirty="0"/>
+              <a:t>Infra Risk Score Card</a:t>
             </a:r>
           </a:p>
         </p:txBody>
@@ -3257,7 +3979,1028 @@
     </p:spTree>
     <p:extLst>
       <p:ext uri="{BB962C8B-B14F-4D97-AF65-F5344CB8AC3E}">
-        <p14:creationId xmlns:p14="http://schemas.microsoft.com/office/powerpoint/2010/main" val="914384786"/>
+        <p14:creationId xmlns:p14="http://schemas.microsoft.com/office/powerpoint/2010/main" val="292264660"/>
+      </p:ext>
+    </p:extLst>
+  </p:cSld>
+  <p:clrMapOvr>
+    <a:masterClrMapping/>
+  </p:clrMapOvr>
+  <p:timing>
+    <p:tnLst>
+      <p:par>
+        <p:cTn id="1" dur="indefinite" restart="never" nodeType="tmRoot"/>
+      </p:par>
+    </p:tnLst>
+  </p:timing>
+</p:sld>
+</file>
+
+<file path=ppt/slides/slide3.xml><?xml version="1.0" encoding="utf-8"?>
+<p:sld xmlns:a="http://schemas.openxmlformats.org/drawingml/2006/main" xmlns:r="http://schemas.openxmlformats.org/officeDocument/2006/relationships" xmlns:p="http://schemas.openxmlformats.org/presentationml/2006/main">
+  <p:cSld>
+    <p:spTree>
+      <p:nvGrpSpPr>
+        <p:cNvPr id="1" name=""/>
+        <p:cNvGrpSpPr/>
+        <p:nvPr/>
+      </p:nvGrpSpPr>
+      <p:grpSpPr>
+        <a:xfrm>
+          <a:off x="0" y="0"/>
+          <a:ext cx="0" cy="0"/>
+          <a:chOff x="0" y="0"/>
+          <a:chExt cx="0" cy="0"/>
+        </a:xfrm>
+      </p:grpSpPr>
+      <p:sp>
+        <p:nvSpPr>
+          <p:cNvPr id="10" name="Rounded Rectangle 9"/>
+          <p:cNvSpPr/>
+          <p:nvPr/>
+        </p:nvSpPr>
+        <p:spPr>
+          <a:xfrm>
+            <a:off x="1017443" y="4031764"/>
+            <a:ext cx="2917247" cy="1399219"/>
+          </a:xfrm>
+          <a:prstGeom prst="roundRect">
+            <a:avLst/>
+          </a:prstGeom>
+          <a:noFill/>
+          <a:ln w="38100">
+            <a:solidFill>
+              <a:schemeClr val="bg1">
+                <a:lumMod val="50000"/>
+              </a:schemeClr>
+            </a:solidFill>
+          </a:ln>
+        </p:spPr>
+        <p:style>
+          <a:lnRef idx="2">
+            <a:schemeClr val="accent1">
+              <a:shade val="50000"/>
+            </a:schemeClr>
+          </a:lnRef>
+          <a:fillRef idx="1">
+            <a:schemeClr val="accent1"/>
+          </a:fillRef>
+          <a:effectRef idx="0">
+            <a:schemeClr val="accent1"/>
+          </a:effectRef>
+          <a:fontRef idx="minor">
+            <a:schemeClr val="lt1"/>
+          </a:fontRef>
+        </p:style>
+        <p:txBody>
+          <a:bodyPr rtlCol="0" anchor="ctr"/>
+          <a:lstStyle/>
+          <a:p>
+            <a:pPr algn="ctr"/>
+            <a:endParaRPr lang="en-US" sz="1050"/>
+          </a:p>
+        </p:txBody>
+      </p:sp>
+      <p:sp>
+        <p:nvSpPr>
+          <p:cNvPr id="11" name="Oval 10"/>
+          <p:cNvSpPr/>
+          <p:nvPr/>
+        </p:nvSpPr>
+        <p:spPr>
+          <a:xfrm>
+            <a:off x="1349954" y="4254891"/>
+            <a:ext cx="932581" cy="916319"/>
+          </a:xfrm>
+          <a:prstGeom prst="ellipse">
+            <a:avLst/>
+          </a:prstGeom>
+          <a:solidFill>
+            <a:srgbClr val="FFC000"/>
+          </a:solidFill>
+          <a:ln>
+            <a:solidFill>
+              <a:schemeClr val="tx1"/>
+            </a:solidFill>
+          </a:ln>
+        </p:spPr>
+        <p:style>
+          <a:lnRef idx="2">
+            <a:schemeClr val="accent1">
+              <a:shade val="50000"/>
+            </a:schemeClr>
+          </a:lnRef>
+          <a:fillRef idx="1">
+            <a:schemeClr val="accent1"/>
+          </a:fillRef>
+          <a:effectRef idx="0">
+            <a:schemeClr val="accent1"/>
+          </a:effectRef>
+          <a:fontRef idx="minor">
+            <a:schemeClr val="lt1"/>
+          </a:fontRef>
+        </p:style>
+        <p:txBody>
+          <a:bodyPr rtlCol="0" anchor="ctr"/>
+          <a:lstStyle/>
+          <a:p>
+            <a:pPr algn="ctr"/>
+            <a:r>
+              <a:rPr lang="en-US" sz="4050" dirty="0">
+                <a:solidFill>
+                  <a:schemeClr val="tx1"/>
+                </a:solidFill>
+              </a:rPr>
+              <a:t>B</a:t>
+            </a:r>
+          </a:p>
+        </p:txBody>
+      </p:sp>
+      <p:sp>
+        <p:nvSpPr>
+          <p:cNvPr id="12" name="TextBox 11"/>
+          <p:cNvSpPr txBox="1"/>
+          <p:nvPr/>
+        </p:nvSpPr>
+        <p:spPr>
+          <a:xfrm>
+            <a:off x="1558636" y="3711284"/>
+            <a:ext cx="2337099" cy="338554"/>
+          </a:xfrm>
+          <a:prstGeom prst="rect">
+            <a:avLst/>
+          </a:prstGeom>
+          <a:noFill/>
+        </p:spPr>
+        <p:txBody>
+          <a:bodyPr wrap="square" rtlCol="0">
+            <a:spAutoFit/>
+          </a:bodyPr>
+          <a:lstStyle/>
+          <a:p>
+            <a:r>
+              <a:rPr lang="en-US" sz="1600" b="1" dirty="0" smtClean="0"/>
+              <a:t>Security </a:t>
+            </a:r>
+            <a:r>
+              <a:rPr lang="en-US" sz="1600" b="1" dirty="0"/>
+              <a:t>Risk Score Card</a:t>
+            </a:r>
+          </a:p>
+        </p:txBody>
+      </p:sp>
+      <p:sp>
+        <p:nvSpPr>
+          <p:cNvPr id="13" name="Rounded Rectangle 12"/>
+          <p:cNvSpPr/>
+          <p:nvPr/>
+        </p:nvSpPr>
+        <p:spPr>
+          <a:xfrm>
+            <a:off x="5194590" y="665106"/>
+            <a:ext cx="2917247" cy="1399219"/>
+          </a:xfrm>
+          <a:prstGeom prst="roundRect">
+            <a:avLst/>
+          </a:prstGeom>
+          <a:noFill/>
+          <a:ln w="38100">
+            <a:solidFill>
+              <a:schemeClr val="bg1">
+                <a:lumMod val="50000"/>
+              </a:schemeClr>
+            </a:solidFill>
+          </a:ln>
+        </p:spPr>
+        <p:style>
+          <a:lnRef idx="2">
+            <a:schemeClr val="accent1">
+              <a:shade val="50000"/>
+            </a:schemeClr>
+          </a:lnRef>
+          <a:fillRef idx="1">
+            <a:schemeClr val="accent1"/>
+          </a:fillRef>
+          <a:effectRef idx="0">
+            <a:schemeClr val="accent1"/>
+          </a:effectRef>
+          <a:fontRef idx="minor">
+            <a:schemeClr val="lt1"/>
+          </a:fontRef>
+        </p:style>
+        <p:txBody>
+          <a:bodyPr rtlCol="0" anchor="ctr"/>
+          <a:lstStyle/>
+          <a:p>
+            <a:pPr algn="ctr"/>
+            <a:endParaRPr lang="en-US" sz="1050"/>
+          </a:p>
+        </p:txBody>
+      </p:sp>
+      <p:sp>
+        <p:nvSpPr>
+          <p:cNvPr id="14" name="Oval 13"/>
+          <p:cNvSpPr/>
+          <p:nvPr/>
+        </p:nvSpPr>
+        <p:spPr>
+          <a:xfrm>
+            <a:off x="5527101" y="888233"/>
+            <a:ext cx="932581" cy="916319"/>
+          </a:xfrm>
+          <a:prstGeom prst="ellipse">
+            <a:avLst/>
+          </a:prstGeom>
+          <a:solidFill>
+            <a:srgbClr val="FF0000"/>
+          </a:solidFill>
+          <a:ln>
+            <a:solidFill>
+              <a:schemeClr val="tx1"/>
+            </a:solidFill>
+          </a:ln>
+        </p:spPr>
+        <p:style>
+          <a:lnRef idx="2">
+            <a:schemeClr val="accent1">
+              <a:shade val="50000"/>
+            </a:schemeClr>
+          </a:lnRef>
+          <a:fillRef idx="1">
+            <a:schemeClr val="accent1"/>
+          </a:fillRef>
+          <a:effectRef idx="0">
+            <a:schemeClr val="accent1"/>
+          </a:effectRef>
+          <a:fontRef idx="minor">
+            <a:schemeClr val="lt1"/>
+          </a:fontRef>
+        </p:style>
+        <p:txBody>
+          <a:bodyPr rtlCol="0" anchor="ctr"/>
+          <a:lstStyle/>
+          <a:p>
+            <a:pPr algn="ctr"/>
+            <a:r>
+              <a:rPr lang="en-US" sz="4050" dirty="0">
+                <a:solidFill>
+                  <a:schemeClr val="tx1"/>
+                </a:solidFill>
+              </a:rPr>
+              <a:t>C</a:t>
+            </a:r>
+          </a:p>
+        </p:txBody>
+      </p:sp>
+      <p:sp>
+        <p:nvSpPr>
+          <p:cNvPr id="15" name="TextBox 14"/>
+          <p:cNvSpPr txBox="1"/>
+          <p:nvPr/>
+        </p:nvSpPr>
+        <p:spPr>
+          <a:xfrm>
+            <a:off x="5694219" y="344626"/>
+            <a:ext cx="2378664" cy="338554"/>
+          </a:xfrm>
+          <a:prstGeom prst="rect">
+            <a:avLst/>
+          </a:prstGeom>
+          <a:noFill/>
+        </p:spPr>
+        <p:txBody>
+          <a:bodyPr wrap="square" rtlCol="0">
+            <a:spAutoFit/>
+          </a:bodyPr>
+          <a:lstStyle/>
+          <a:p>
+            <a:r>
+              <a:rPr lang="en-US" sz="1600" b="1" dirty="0" smtClean="0"/>
+              <a:t>Security </a:t>
+            </a:r>
+            <a:r>
+              <a:rPr lang="en-US" sz="1600" b="1" dirty="0"/>
+              <a:t>Risk Score Card</a:t>
+            </a:r>
+          </a:p>
+        </p:txBody>
+      </p:sp>
+      <p:sp>
+        <p:nvSpPr>
+          <p:cNvPr id="16" name="Rounded Rectangle 15"/>
+          <p:cNvSpPr/>
+          <p:nvPr/>
+        </p:nvSpPr>
+        <p:spPr>
+          <a:xfrm>
+            <a:off x="5194590" y="4031763"/>
+            <a:ext cx="2917247" cy="1399219"/>
+          </a:xfrm>
+          <a:prstGeom prst="roundRect">
+            <a:avLst/>
+          </a:prstGeom>
+          <a:noFill/>
+          <a:ln w="38100">
+            <a:solidFill>
+              <a:schemeClr val="bg1">
+                <a:lumMod val="50000"/>
+              </a:schemeClr>
+            </a:solidFill>
+          </a:ln>
+        </p:spPr>
+        <p:style>
+          <a:lnRef idx="2">
+            <a:schemeClr val="accent1">
+              <a:shade val="50000"/>
+            </a:schemeClr>
+          </a:lnRef>
+          <a:fillRef idx="1">
+            <a:schemeClr val="accent1"/>
+          </a:fillRef>
+          <a:effectRef idx="0">
+            <a:schemeClr val="accent1"/>
+          </a:effectRef>
+          <a:fontRef idx="minor">
+            <a:schemeClr val="lt1"/>
+          </a:fontRef>
+        </p:style>
+        <p:txBody>
+          <a:bodyPr rtlCol="0" anchor="ctr"/>
+          <a:lstStyle/>
+          <a:p>
+            <a:pPr algn="ctr"/>
+            <a:endParaRPr lang="en-US" sz="1050"/>
+          </a:p>
+        </p:txBody>
+      </p:sp>
+      <p:sp>
+        <p:nvSpPr>
+          <p:cNvPr id="17" name="Oval 16"/>
+          <p:cNvSpPr/>
+          <p:nvPr/>
+        </p:nvSpPr>
+        <p:spPr>
+          <a:xfrm>
+            <a:off x="5527101" y="4254890"/>
+            <a:ext cx="932581" cy="916319"/>
+          </a:xfrm>
+          <a:prstGeom prst="ellipse">
+            <a:avLst/>
+          </a:prstGeom>
+          <a:solidFill>
+            <a:schemeClr val="accent6">
+              <a:lumMod val="75000"/>
+            </a:schemeClr>
+          </a:solidFill>
+          <a:ln>
+            <a:solidFill>
+              <a:schemeClr val="tx1"/>
+            </a:solidFill>
+          </a:ln>
+        </p:spPr>
+        <p:style>
+          <a:lnRef idx="2">
+            <a:schemeClr val="accent1">
+              <a:shade val="50000"/>
+            </a:schemeClr>
+          </a:lnRef>
+          <a:fillRef idx="1">
+            <a:schemeClr val="accent1"/>
+          </a:fillRef>
+          <a:effectRef idx="0">
+            <a:schemeClr val="accent1"/>
+          </a:effectRef>
+          <a:fontRef idx="minor">
+            <a:schemeClr val="lt1"/>
+          </a:fontRef>
+        </p:style>
+        <p:txBody>
+          <a:bodyPr rtlCol="0" anchor="ctr"/>
+          <a:lstStyle/>
+          <a:p>
+            <a:pPr algn="ctr"/>
+            <a:r>
+              <a:rPr lang="en-US" sz="4050" dirty="0">
+                <a:solidFill>
+                  <a:schemeClr val="tx1"/>
+                </a:solidFill>
+              </a:rPr>
+              <a:t>A</a:t>
+            </a:r>
+          </a:p>
+        </p:txBody>
+      </p:sp>
+      <p:sp>
+        <p:nvSpPr>
+          <p:cNvPr id="18" name="TextBox 17"/>
+          <p:cNvSpPr txBox="1"/>
+          <p:nvPr/>
+        </p:nvSpPr>
+        <p:spPr>
+          <a:xfrm>
+            <a:off x="5694219" y="3711283"/>
+            <a:ext cx="2378663" cy="338554"/>
+          </a:xfrm>
+          <a:prstGeom prst="rect">
+            <a:avLst/>
+          </a:prstGeom>
+          <a:noFill/>
+        </p:spPr>
+        <p:txBody>
+          <a:bodyPr wrap="square" rtlCol="0">
+            <a:spAutoFit/>
+          </a:bodyPr>
+          <a:lstStyle/>
+          <a:p>
+            <a:r>
+              <a:rPr lang="en-US" sz="1600" b="1" dirty="0" smtClean="0"/>
+              <a:t>Security </a:t>
+            </a:r>
+            <a:r>
+              <a:rPr lang="en-US" sz="1600" b="1" dirty="0"/>
+              <a:t>Risk Score Card</a:t>
+            </a:r>
+          </a:p>
+        </p:txBody>
+      </p:sp>
+    </p:spTree>
+    <p:extLst>
+      <p:ext uri="{BB962C8B-B14F-4D97-AF65-F5344CB8AC3E}">
+        <p14:creationId xmlns:p14="http://schemas.microsoft.com/office/powerpoint/2010/main" val="2400795157"/>
+      </p:ext>
+    </p:extLst>
+  </p:cSld>
+  <p:clrMapOvr>
+    <a:masterClrMapping/>
+  </p:clrMapOvr>
+  <p:timing>
+    <p:tnLst>
+      <p:par>
+        <p:cTn id="1" dur="indefinite" restart="never" nodeType="tmRoot"/>
+      </p:par>
+    </p:tnLst>
+  </p:timing>
+</p:sld>
+</file>
+
+<file path=ppt/slides/slide4.xml><?xml version="1.0" encoding="utf-8"?>
+<p:sld xmlns:a="http://schemas.openxmlformats.org/drawingml/2006/main" xmlns:r="http://schemas.openxmlformats.org/officeDocument/2006/relationships" xmlns:p="http://schemas.openxmlformats.org/presentationml/2006/main">
+  <p:cSld>
+    <p:spTree>
+      <p:nvGrpSpPr>
+        <p:cNvPr id="1" name=""/>
+        <p:cNvGrpSpPr/>
+        <p:nvPr/>
+      </p:nvGrpSpPr>
+      <p:grpSpPr>
+        <a:xfrm>
+          <a:off x="0" y="0"/>
+          <a:ext cx="0" cy="0"/>
+          <a:chOff x="0" y="0"/>
+          <a:chExt cx="0" cy="0"/>
+        </a:xfrm>
+      </p:grpSpPr>
+      <p:sp>
+        <p:nvSpPr>
+          <p:cNvPr id="2" name="Rounded Rectangle 1"/>
+          <p:cNvSpPr/>
+          <p:nvPr/>
+        </p:nvSpPr>
+        <p:spPr>
+          <a:xfrm>
+            <a:off x="1020908" y="668571"/>
+            <a:ext cx="2917247" cy="1399219"/>
+          </a:xfrm>
+          <a:prstGeom prst="roundRect">
+            <a:avLst/>
+          </a:prstGeom>
+          <a:noFill/>
+          <a:ln w="38100">
+            <a:solidFill>
+              <a:schemeClr val="bg1">
+                <a:lumMod val="50000"/>
+              </a:schemeClr>
+            </a:solidFill>
+          </a:ln>
+        </p:spPr>
+        <p:style>
+          <a:lnRef idx="2">
+            <a:schemeClr val="accent1">
+              <a:shade val="50000"/>
+            </a:schemeClr>
+          </a:lnRef>
+          <a:fillRef idx="1">
+            <a:schemeClr val="accent1"/>
+          </a:fillRef>
+          <a:effectRef idx="0">
+            <a:schemeClr val="accent1"/>
+          </a:effectRef>
+          <a:fontRef idx="minor">
+            <a:schemeClr val="lt1"/>
+          </a:fontRef>
+        </p:style>
+        <p:txBody>
+          <a:bodyPr rtlCol="0" anchor="ctr"/>
+          <a:lstStyle/>
+          <a:p>
+            <a:pPr algn="ctr"/>
+            <a:endParaRPr lang="en-US" sz="1050"/>
+          </a:p>
+        </p:txBody>
+      </p:sp>
+      <p:sp>
+        <p:nvSpPr>
+          <p:cNvPr id="3" name="Oval 2"/>
+          <p:cNvSpPr/>
+          <p:nvPr/>
+        </p:nvSpPr>
+        <p:spPr>
+          <a:xfrm>
+            <a:off x="1353419" y="891698"/>
+            <a:ext cx="932581" cy="916319"/>
+          </a:xfrm>
+          <a:prstGeom prst="ellipse">
+            <a:avLst/>
+          </a:prstGeom>
+          <a:solidFill>
+            <a:srgbClr val="FF0000"/>
+          </a:solidFill>
+          <a:ln>
+            <a:solidFill>
+              <a:schemeClr val="tx1"/>
+            </a:solidFill>
+          </a:ln>
+        </p:spPr>
+        <p:style>
+          <a:lnRef idx="2">
+            <a:schemeClr val="accent1">
+              <a:shade val="50000"/>
+            </a:schemeClr>
+          </a:lnRef>
+          <a:fillRef idx="1">
+            <a:schemeClr val="accent1"/>
+          </a:fillRef>
+          <a:effectRef idx="0">
+            <a:schemeClr val="accent1"/>
+          </a:effectRef>
+          <a:fontRef idx="minor">
+            <a:schemeClr val="lt1"/>
+          </a:fontRef>
+        </p:style>
+        <p:txBody>
+          <a:bodyPr rtlCol="0" anchor="ctr"/>
+          <a:lstStyle/>
+          <a:p>
+            <a:pPr algn="ctr"/>
+            <a:r>
+              <a:rPr lang="en-US" sz="4050" dirty="0">
+                <a:solidFill>
+                  <a:schemeClr val="tx1"/>
+                </a:solidFill>
+              </a:rPr>
+              <a:t>D</a:t>
+            </a:r>
+          </a:p>
+        </p:txBody>
+      </p:sp>
+      <p:sp>
+        <p:nvSpPr>
+          <p:cNvPr id="5" name="TextBox 4"/>
+          <p:cNvSpPr txBox="1"/>
+          <p:nvPr/>
+        </p:nvSpPr>
+        <p:spPr>
+          <a:xfrm>
+            <a:off x="1745673" y="348091"/>
+            <a:ext cx="2153527" cy="338554"/>
+          </a:xfrm>
+          <a:prstGeom prst="rect">
+            <a:avLst/>
+          </a:prstGeom>
+          <a:noFill/>
+        </p:spPr>
+        <p:txBody>
+          <a:bodyPr wrap="square" rtlCol="0">
+            <a:spAutoFit/>
+          </a:bodyPr>
+          <a:lstStyle/>
+          <a:p>
+            <a:r>
+              <a:rPr lang="en-US" sz="1600" b="1" dirty="0" smtClean="0"/>
+              <a:t>People Risk Score Card</a:t>
+            </a:r>
+            <a:endParaRPr lang="en-US" sz="1600" b="1" dirty="0"/>
+          </a:p>
+        </p:txBody>
+      </p:sp>
+      <p:sp>
+        <p:nvSpPr>
+          <p:cNvPr id="10" name="Rounded Rectangle 9"/>
+          <p:cNvSpPr/>
+          <p:nvPr/>
+        </p:nvSpPr>
+        <p:spPr>
+          <a:xfrm>
+            <a:off x="1017443" y="4031764"/>
+            <a:ext cx="2917247" cy="1399219"/>
+          </a:xfrm>
+          <a:prstGeom prst="roundRect">
+            <a:avLst/>
+          </a:prstGeom>
+          <a:noFill/>
+          <a:ln w="38100">
+            <a:solidFill>
+              <a:schemeClr val="bg1">
+                <a:lumMod val="50000"/>
+              </a:schemeClr>
+            </a:solidFill>
+          </a:ln>
+        </p:spPr>
+        <p:style>
+          <a:lnRef idx="2">
+            <a:schemeClr val="accent1">
+              <a:shade val="50000"/>
+            </a:schemeClr>
+          </a:lnRef>
+          <a:fillRef idx="1">
+            <a:schemeClr val="accent1"/>
+          </a:fillRef>
+          <a:effectRef idx="0">
+            <a:schemeClr val="accent1"/>
+          </a:effectRef>
+          <a:fontRef idx="minor">
+            <a:schemeClr val="lt1"/>
+          </a:fontRef>
+        </p:style>
+        <p:txBody>
+          <a:bodyPr rtlCol="0" anchor="ctr"/>
+          <a:lstStyle/>
+          <a:p>
+            <a:pPr algn="ctr"/>
+            <a:endParaRPr lang="en-US" sz="1050"/>
+          </a:p>
+        </p:txBody>
+      </p:sp>
+      <p:sp>
+        <p:nvSpPr>
+          <p:cNvPr id="11" name="Oval 10"/>
+          <p:cNvSpPr/>
+          <p:nvPr/>
+        </p:nvSpPr>
+        <p:spPr>
+          <a:xfrm>
+            <a:off x="1349954" y="4254891"/>
+            <a:ext cx="932581" cy="916319"/>
+          </a:xfrm>
+          <a:prstGeom prst="ellipse">
+            <a:avLst/>
+          </a:prstGeom>
+          <a:solidFill>
+            <a:srgbClr val="FFC000"/>
+          </a:solidFill>
+          <a:ln>
+            <a:solidFill>
+              <a:schemeClr val="tx1"/>
+            </a:solidFill>
+          </a:ln>
+        </p:spPr>
+        <p:style>
+          <a:lnRef idx="2">
+            <a:schemeClr val="accent1">
+              <a:shade val="50000"/>
+            </a:schemeClr>
+          </a:lnRef>
+          <a:fillRef idx="1">
+            <a:schemeClr val="accent1"/>
+          </a:fillRef>
+          <a:effectRef idx="0">
+            <a:schemeClr val="accent1"/>
+          </a:effectRef>
+          <a:fontRef idx="minor">
+            <a:schemeClr val="lt1"/>
+          </a:fontRef>
+        </p:style>
+        <p:txBody>
+          <a:bodyPr rtlCol="0" anchor="ctr"/>
+          <a:lstStyle/>
+          <a:p>
+            <a:pPr algn="ctr"/>
+            <a:r>
+              <a:rPr lang="en-US" sz="4050" dirty="0">
+                <a:solidFill>
+                  <a:schemeClr val="tx1"/>
+                </a:solidFill>
+              </a:rPr>
+              <a:t>B</a:t>
+            </a:r>
+          </a:p>
+        </p:txBody>
+      </p:sp>
+      <p:sp>
+        <p:nvSpPr>
+          <p:cNvPr id="12" name="TextBox 11"/>
+          <p:cNvSpPr txBox="1"/>
+          <p:nvPr/>
+        </p:nvSpPr>
+        <p:spPr>
+          <a:xfrm>
+            <a:off x="1742208" y="3711284"/>
+            <a:ext cx="2153527" cy="338554"/>
+          </a:xfrm>
+          <a:prstGeom prst="rect">
+            <a:avLst/>
+          </a:prstGeom>
+          <a:noFill/>
+        </p:spPr>
+        <p:txBody>
+          <a:bodyPr wrap="square" rtlCol="0">
+            <a:spAutoFit/>
+          </a:bodyPr>
+          <a:lstStyle/>
+          <a:p>
+            <a:r>
+              <a:rPr lang="en-US" sz="1600" b="1" dirty="0" smtClean="0"/>
+              <a:t>People Risk Score Card</a:t>
+            </a:r>
+            <a:endParaRPr lang="en-US" sz="1600" b="1" dirty="0"/>
+          </a:p>
+        </p:txBody>
+      </p:sp>
+      <p:sp>
+        <p:nvSpPr>
+          <p:cNvPr id="13" name="Rounded Rectangle 12"/>
+          <p:cNvSpPr/>
+          <p:nvPr/>
+        </p:nvSpPr>
+        <p:spPr>
+          <a:xfrm>
+            <a:off x="5194590" y="665106"/>
+            <a:ext cx="2917247" cy="1399219"/>
+          </a:xfrm>
+          <a:prstGeom prst="roundRect">
+            <a:avLst/>
+          </a:prstGeom>
+          <a:noFill/>
+          <a:ln w="38100">
+            <a:solidFill>
+              <a:schemeClr val="bg1">
+                <a:lumMod val="50000"/>
+              </a:schemeClr>
+            </a:solidFill>
+          </a:ln>
+        </p:spPr>
+        <p:style>
+          <a:lnRef idx="2">
+            <a:schemeClr val="accent1">
+              <a:shade val="50000"/>
+            </a:schemeClr>
+          </a:lnRef>
+          <a:fillRef idx="1">
+            <a:schemeClr val="accent1"/>
+          </a:fillRef>
+          <a:effectRef idx="0">
+            <a:schemeClr val="accent1"/>
+          </a:effectRef>
+          <a:fontRef idx="minor">
+            <a:schemeClr val="lt1"/>
+          </a:fontRef>
+        </p:style>
+        <p:txBody>
+          <a:bodyPr rtlCol="0" anchor="ctr"/>
+          <a:lstStyle/>
+          <a:p>
+            <a:pPr algn="ctr"/>
+            <a:endParaRPr lang="en-US" sz="1050"/>
+          </a:p>
+        </p:txBody>
+      </p:sp>
+      <p:sp>
+        <p:nvSpPr>
+          <p:cNvPr id="14" name="Oval 13"/>
+          <p:cNvSpPr/>
+          <p:nvPr/>
+        </p:nvSpPr>
+        <p:spPr>
+          <a:xfrm>
+            <a:off x="5527101" y="888233"/>
+            <a:ext cx="932581" cy="916319"/>
+          </a:xfrm>
+          <a:prstGeom prst="ellipse">
+            <a:avLst/>
+          </a:prstGeom>
+          <a:solidFill>
+            <a:schemeClr val="accent4">
+              <a:lumMod val="60000"/>
+              <a:lumOff val="40000"/>
+            </a:schemeClr>
+          </a:solidFill>
+          <a:ln>
+            <a:solidFill>
+              <a:schemeClr val="tx1"/>
+            </a:solidFill>
+          </a:ln>
+        </p:spPr>
+        <p:style>
+          <a:lnRef idx="2">
+            <a:schemeClr val="accent1">
+              <a:shade val="50000"/>
+            </a:schemeClr>
+          </a:lnRef>
+          <a:fillRef idx="1">
+            <a:schemeClr val="accent1"/>
+          </a:fillRef>
+          <a:effectRef idx="0">
+            <a:schemeClr val="accent1"/>
+          </a:effectRef>
+          <a:fontRef idx="minor">
+            <a:schemeClr val="lt1"/>
+          </a:fontRef>
+        </p:style>
+        <p:txBody>
+          <a:bodyPr rtlCol="0" anchor="ctr"/>
+          <a:lstStyle/>
+          <a:p>
+            <a:pPr algn="ctr"/>
+            <a:r>
+              <a:rPr lang="en-US" sz="4050" dirty="0">
+                <a:solidFill>
+                  <a:schemeClr val="tx1"/>
+                </a:solidFill>
+              </a:rPr>
+              <a:t>C</a:t>
+            </a:r>
+          </a:p>
+        </p:txBody>
+      </p:sp>
+      <p:sp>
+        <p:nvSpPr>
+          <p:cNvPr id="15" name="TextBox 14"/>
+          <p:cNvSpPr txBox="1"/>
+          <p:nvPr/>
+        </p:nvSpPr>
+        <p:spPr>
+          <a:xfrm>
+            <a:off x="5919355" y="344626"/>
+            <a:ext cx="2153527" cy="338554"/>
+          </a:xfrm>
+          <a:prstGeom prst="rect">
+            <a:avLst/>
+          </a:prstGeom>
+          <a:noFill/>
+        </p:spPr>
+        <p:txBody>
+          <a:bodyPr wrap="square" rtlCol="0">
+            <a:spAutoFit/>
+          </a:bodyPr>
+          <a:lstStyle/>
+          <a:p>
+            <a:r>
+              <a:rPr lang="en-US" sz="1600" b="1" dirty="0" smtClean="0"/>
+              <a:t>People Risk Score Card</a:t>
+            </a:r>
+            <a:endParaRPr lang="en-US" sz="1600" b="1" dirty="0"/>
+          </a:p>
+        </p:txBody>
+      </p:sp>
+      <p:sp>
+        <p:nvSpPr>
+          <p:cNvPr id="16" name="Rounded Rectangle 15"/>
+          <p:cNvSpPr/>
+          <p:nvPr/>
+        </p:nvSpPr>
+        <p:spPr>
+          <a:xfrm>
+            <a:off x="5194590" y="4031763"/>
+            <a:ext cx="2917247" cy="1399219"/>
+          </a:xfrm>
+          <a:prstGeom prst="roundRect">
+            <a:avLst/>
+          </a:prstGeom>
+          <a:noFill/>
+          <a:ln w="38100">
+            <a:solidFill>
+              <a:schemeClr val="bg1">
+                <a:lumMod val="50000"/>
+              </a:schemeClr>
+            </a:solidFill>
+          </a:ln>
+        </p:spPr>
+        <p:style>
+          <a:lnRef idx="2">
+            <a:schemeClr val="accent1">
+              <a:shade val="50000"/>
+            </a:schemeClr>
+          </a:lnRef>
+          <a:fillRef idx="1">
+            <a:schemeClr val="accent1"/>
+          </a:fillRef>
+          <a:effectRef idx="0">
+            <a:schemeClr val="accent1"/>
+          </a:effectRef>
+          <a:fontRef idx="minor">
+            <a:schemeClr val="lt1"/>
+          </a:fontRef>
+        </p:style>
+        <p:txBody>
+          <a:bodyPr rtlCol="0" anchor="ctr"/>
+          <a:lstStyle/>
+          <a:p>
+            <a:pPr algn="ctr"/>
+            <a:endParaRPr lang="en-US" sz="1050"/>
+          </a:p>
+        </p:txBody>
+      </p:sp>
+      <p:sp>
+        <p:nvSpPr>
+          <p:cNvPr id="17" name="Oval 16"/>
+          <p:cNvSpPr/>
+          <p:nvPr/>
+        </p:nvSpPr>
+        <p:spPr>
+          <a:xfrm>
+            <a:off x="5527101" y="4254890"/>
+            <a:ext cx="932581" cy="916319"/>
+          </a:xfrm>
+          <a:prstGeom prst="ellipse">
+            <a:avLst/>
+          </a:prstGeom>
+          <a:solidFill>
+            <a:schemeClr val="accent6">
+              <a:lumMod val="75000"/>
+            </a:schemeClr>
+          </a:solidFill>
+          <a:ln>
+            <a:solidFill>
+              <a:schemeClr val="tx1"/>
+            </a:solidFill>
+          </a:ln>
+        </p:spPr>
+        <p:style>
+          <a:lnRef idx="2">
+            <a:schemeClr val="accent1">
+              <a:shade val="50000"/>
+            </a:schemeClr>
+          </a:lnRef>
+          <a:fillRef idx="1">
+            <a:schemeClr val="accent1"/>
+          </a:fillRef>
+          <a:effectRef idx="0">
+            <a:schemeClr val="accent1"/>
+          </a:effectRef>
+          <a:fontRef idx="minor">
+            <a:schemeClr val="lt1"/>
+          </a:fontRef>
+        </p:style>
+        <p:txBody>
+          <a:bodyPr rtlCol="0" anchor="ctr"/>
+          <a:lstStyle/>
+          <a:p>
+            <a:pPr algn="ctr"/>
+            <a:r>
+              <a:rPr lang="en-US" sz="4050" dirty="0">
+                <a:solidFill>
+                  <a:schemeClr val="tx1"/>
+                </a:solidFill>
+              </a:rPr>
+              <a:t>A</a:t>
+            </a:r>
+          </a:p>
+        </p:txBody>
+      </p:sp>
+      <p:sp>
+        <p:nvSpPr>
+          <p:cNvPr id="18" name="TextBox 17"/>
+          <p:cNvSpPr txBox="1"/>
+          <p:nvPr/>
+        </p:nvSpPr>
+        <p:spPr>
+          <a:xfrm>
+            <a:off x="5919355" y="3711283"/>
+            <a:ext cx="2153527" cy="338554"/>
+          </a:xfrm>
+          <a:prstGeom prst="rect">
+            <a:avLst/>
+          </a:prstGeom>
+          <a:noFill/>
+        </p:spPr>
+        <p:txBody>
+          <a:bodyPr wrap="square" rtlCol="0">
+            <a:spAutoFit/>
+          </a:bodyPr>
+          <a:lstStyle/>
+          <a:p>
+            <a:r>
+              <a:rPr lang="en-US" sz="1600" b="1" dirty="0" smtClean="0"/>
+              <a:t>People Risk Score Card</a:t>
+            </a:r>
+            <a:endParaRPr lang="en-US" sz="1600" b="1" dirty="0"/>
+          </a:p>
+        </p:txBody>
+      </p:sp>
+    </p:spTree>
+    <p:extLst>
+      <p:ext uri="{BB962C8B-B14F-4D97-AF65-F5344CB8AC3E}">
+        <p14:creationId xmlns:p14="http://schemas.microsoft.com/office/powerpoint/2010/main" val="2996316829"/>
       </p:ext>
     </p:extLst>
   </p:cSld>

</xml_diff>